<commit_message>
Add more code + presentation + plots
</commit_message>
<xml_diff>
--- a/Folien_Modularbeit.pptx
+++ b/Folien_Modularbeit.pptx
@@ -8,6 +8,12 @@
     <p:sldId id="256" r:id="rId2"/>
     <p:sldId id="257" r:id="rId3"/>
     <p:sldId id="258" r:id="rId4"/>
+    <p:sldId id="260" r:id="rId5"/>
+    <p:sldId id="261" r:id="rId6"/>
+    <p:sldId id="262" r:id="rId7"/>
+    <p:sldId id="263" r:id="rId8"/>
+    <p:sldId id="264" r:id="rId9"/>
+    <p:sldId id="265" r:id="rId10"/>
   </p:sldIdLst>
   <p:sldSz cx="12192000" cy="6858000"/>
   <p:notesSz cx="6858000" cy="9144000"/>
@@ -3442,15 +3448,7 @@
             </a:r>
             <a:r>
               <a:rPr lang="de-DE" dirty="0"/>
-              <a:t> </a:t>
-            </a:r>
-            <a:r>
-              <a:rPr lang="de-DE" dirty="0" err="1"/>
-              <a:t>Neural</a:t>
-            </a:r>
-            <a:r>
-              <a:rPr lang="de-DE" dirty="0"/>
-              <a:t> Network</a:t>
+              <a:t> Neural Network</a:t>
             </a:r>
           </a:p>
           <a:p>
@@ -3464,15 +3462,7 @@
             </a:r>
             <a:r>
               <a:rPr lang="de-DE" dirty="0"/>
-              <a:t> </a:t>
-            </a:r>
-            <a:r>
-              <a:rPr lang="de-DE" dirty="0" err="1"/>
-              <a:t>Neural</a:t>
-            </a:r>
-            <a:r>
-              <a:rPr lang="de-DE" dirty="0"/>
-              <a:t> Network mit Autoencoder</a:t>
+              <a:t> Neural Network mit Autoencoder</a:t>
             </a:r>
           </a:p>
           <a:p>
@@ -3662,7 +3652,7 @@
           <a:lstStyle/>
           <a:p>
             <a:r>
-              <a:rPr lang="de-DE">
+              <a:rPr lang="de-DE" dirty="0">
                 <a:solidFill>
                   <a:srgbClr val="FFFFFF"/>
                 </a:solidFill>
@@ -3672,7 +3662,7 @@
           </a:p>
           <a:p>
             <a:r>
-              <a:rPr lang="de-DE">
+              <a:rPr lang="de-DE" dirty="0">
                 <a:solidFill>
                   <a:srgbClr val="FFFFFF"/>
                 </a:solidFill>
@@ -3682,7 +3672,7 @@
           </a:p>
           <a:p>
             <a:r>
-              <a:rPr lang="de-DE">
+              <a:rPr lang="de-DE" dirty="0">
                 <a:solidFill>
                   <a:srgbClr val="FFFFFF"/>
                 </a:solidFill>
@@ -3853,6 +3843,1928 @@
     <p:extLst>
       <p:ext uri="{BB962C8B-B14F-4D97-AF65-F5344CB8AC3E}">
         <p14:creationId xmlns:p14="http://schemas.microsoft.com/office/powerpoint/2010/main" val="697084519"/>
+      </p:ext>
+    </p:extLst>
+  </p:cSld>
+  <p:clrMapOvr>
+    <a:masterClrMapping/>
+  </p:clrMapOvr>
+</p:sld>
+</file>
+
+<file path=ppt/slides/slide4.xml><?xml version="1.0" encoding="utf-8"?>
+<p:sld xmlns:a="http://schemas.openxmlformats.org/drawingml/2006/main" xmlns:r="http://schemas.openxmlformats.org/officeDocument/2006/relationships" xmlns:p="http://schemas.openxmlformats.org/presentationml/2006/main">
+  <p:cSld>
+    <p:bg>
+      <p:bgPr>
+        <a:solidFill>
+          <a:schemeClr val="bg1">
+            <a:lumMod val="95000"/>
+          </a:schemeClr>
+        </a:solidFill>
+        <a:effectLst/>
+      </p:bgPr>
+    </p:bg>
+    <p:spTree>
+      <p:nvGrpSpPr>
+        <p:cNvPr id="1" name=""/>
+        <p:cNvGrpSpPr/>
+        <p:nvPr/>
+      </p:nvGrpSpPr>
+      <p:grpSpPr>
+        <a:xfrm>
+          <a:off x="0" y="0"/>
+          <a:ext cx="0" cy="0"/>
+          <a:chOff x="0" y="0"/>
+          <a:chExt cx="0" cy="0"/>
+        </a:xfrm>
+      </p:grpSpPr>
+      <p:pic>
+        <p:nvPicPr>
+          <p:cNvPr id="6" name="Inhaltsplatzhalter 8">
+            <a:extLst>
+              <a:ext uri="{FF2B5EF4-FFF2-40B4-BE49-F238E27FC236}">
+                <a16:creationId xmlns:a16="http://schemas.microsoft.com/office/drawing/2014/main" id="{D254EAC0-238E-76CB-9556-FE467446F4C0}"/>
+              </a:ext>
+            </a:extLst>
+          </p:cNvPr>
+          <p:cNvPicPr>
+            <a:picLocks noChangeAspect="1"/>
+          </p:cNvPicPr>
+          <p:nvPr/>
+        </p:nvPicPr>
+        <p:blipFill>
+          <a:blip r:embed="rId2"/>
+          <a:stretch>
+            <a:fillRect/>
+          </a:stretch>
+        </p:blipFill>
+        <p:spPr>
+          <a:xfrm>
+            <a:off x="1899428" y="3377509"/>
+            <a:ext cx="1516205" cy="2734043"/>
+          </a:xfrm>
+          <a:prstGeom prst="rect">
+            <a:avLst/>
+          </a:prstGeom>
+        </p:spPr>
+      </p:pic>
+      <p:sp>
+        <p:nvSpPr>
+          <p:cNvPr id="19" name="Rectangle 18">
+            <a:extLst>
+              <a:ext uri="{FF2B5EF4-FFF2-40B4-BE49-F238E27FC236}">
+                <a16:creationId xmlns:a16="http://schemas.microsoft.com/office/drawing/2014/main" id="{DCD3F51F-E0F2-41F0-9EAD-111C87DFF5F6}"/>
+              </a:ext>
+              <a:ext uri="{C183D7F6-B498-43B3-948B-1728B52AA6E4}">
+                <adec:decorative xmlns:adec="http://schemas.microsoft.com/office/drawing/2017/decorative" val="1"/>
+              </a:ext>
+            </a:extLst>
+          </p:cNvPr>
+          <p:cNvSpPr>
+            <a:spLocks noGrp="1" noRot="1" noChangeAspect="1" noMove="1" noResize="1" noEditPoints="1" noAdjustHandles="1" noChangeArrowheads="1" noChangeShapeType="1" noTextEdit="1"/>
+          </p:cNvSpPr>
+          <p:nvPr>
+            <p:extLst>
+              <p:ext uri="{386F3935-93C4-4BCD-93E2-E3B085C9AB24}">
+                <p16:designElem xmlns:p16="http://schemas.microsoft.com/office/powerpoint/2015/main" val="1"/>
+              </p:ext>
+            </p:extLst>
+          </p:nvPr>
+        </p:nvSpPr>
+        <p:spPr>
+          <a:xfrm>
+            <a:off x="5315061" y="-2"/>
+            <a:ext cx="6876939" cy="6858002"/>
+          </a:xfrm>
+          <a:prstGeom prst="rect">
+            <a:avLst/>
+          </a:prstGeom>
+          <a:solidFill>
+            <a:schemeClr val="accent2"/>
+          </a:solidFill>
+          <a:ln>
+            <a:noFill/>
+          </a:ln>
+        </p:spPr>
+        <p:style>
+          <a:lnRef idx="2">
+            <a:schemeClr val="accent1">
+              <a:shade val="50000"/>
+            </a:schemeClr>
+          </a:lnRef>
+          <a:fillRef idx="1">
+            <a:schemeClr val="accent1"/>
+          </a:fillRef>
+          <a:effectRef idx="0">
+            <a:schemeClr val="accent1"/>
+          </a:effectRef>
+          <a:fontRef idx="minor">
+            <a:schemeClr val="lt1"/>
+          </a:fontRef>
+        </p:style>
+        <p:txBody>
+          <a:bodyPr rtlCol="0" anchor="ctr"/>
+          <a:lstStyle/>
+          <a:p>
+            <a:pPr algn="ctr"/>
+            <a:endParaRPr lang="en-US"/>
+          </a:p>
+        </p:txBody>
+      </p:sp>
+      <p:sp>
+        <p:nvSpPr>
+          <p:cNvPr id="2" name="Titel 1">
+            <a:extLst>
+              <a:ext uri="{FF2B5EF4-FFF2-40B4-BE49-F238E27FC236}">
+                <a16:creationId xmlns:a16="http://schemas.microsoft.com/office/drawing/2014/main" id="{CF8CB51D-27A6-4618-15EE-2F79ABF43A7D}"/>
+              </a:ext>
+            </a:extLst>
+          </p:cNvPr>
+          <p:cNvSpPr>
+            <a:spLocks noGrp="1"/>
+          </p:cNvSpPr>
+          <p:nvPr>
+            <p:ph type="title"/>
+          </p:nvPr>
+        </p:nvSpPr>
+        <p:spPr>
+          <a:xfrm>
+            <a:off x="6119732" y="1290025"/>
+            <a:ext cx="5291327" cy="1188720"/>
+          </a:xfrm>
+          <a:solidFill>
+            <a:srgbClr val="FFFFFF"/>
+          </a:solidFill>
+          <a:ln>
+            <a:solidFill>
+              <a:srgbClr val="404040"/>
+            </a:solidFill>
+          </a:ln>
+        </p:spPr>
+        <p:txBody>
+          <a:bodyPr>
+            <a:normAutofit/>
+          </a:bodyPr>
+          <a:lstStyle/>
+          <a:p>
+            <a:r>
+              <a:rPr lang="de-DE" dirty="0"/>
+              <a:t>Deep Neural Network mit Drei Hidden </a:t>
+            </a:r>
+            <a:r>
+              <a:rPr lang="de-DE" dirty="0" err="1"/>
+              <a:t>Layers</a:t>
+            </a:r>
+            <a:r>
+              <a:rPr lang="de-DE" dirty="0"/>
+              <a:t> </a:t>
+            </a:r>
+          </a:p>
+        </p:txBody>
+      </p:sp>
+      <p:pic>
+        <p:nvPicPr>
+          <p:cNvPr id="5" name="Grafik 4" descr="Ein Bild, das Text enthält.&#10;&#10;Automatisch generierte Beschreibung">
+            <a:extLst>
+              <a:ext uri="{FF2B5EF4-FFF2-40B4-BE49-F238E27FC236}">
+                <a16:creationId xmlns:a16="http://schemas.microsoft.com/office/drawing/2014/main" id="{BD5C71EC-67B2-0BB1-040B-DE46CA676FFF}"/>
+              </a:ext>
+            </a:extLst>
+          </p:cNvPr>
+          <p:cNvPicPr>
+            <a:picLocks noChangeAspect="1"/>
+          </p:cNvPicPr>
+          <p:nvPr/>
+        </p:nvPicPr>
+        <p:blipFill>
+          <a:blip r:embed="rId3"/>
+          <a:stretch>
+            <a:fillRect/>
+          </a:stretch>
+        </p:blipFill>
+        <p:spPr>
+          <a:xfrm>
+            <a:off x="609558" y="321733"/>
+            <a:ext cx="4095945" cy="2734043"/>
+          </a:xfrm>
+          <a:prstGeom prst="rect">
+            <a:avLst/>
+          </a:prstGeom>
+        </p:spPr>
+      </p:pic>
+      <p:sp>
+        <p:nvSpPr>
+          <p:cNvPr id="3" name="Inhaltsplatzhalter 2">
+            <a:extLst>
+              <a:ext uri="{FF2B5EF4-FFF2-40B4-BE49-F238E27FC236}">
+                <a16:creationId xmlns:a16="http://schemas.microsoft.com/office/drawing/2014/main" id="{0C1987A8-35B4-B4F5-1688-25469BEB0663}"/>
+              </a:ext>
+            </a:extLst>
+          </p:cNvPr>
+          <p:cNvSpPr>
+            <a:spLocks noGrp="1"/>
+          </p:cNvSpPr>
+          <p:nvPr>
+            <p:ph idx="1"/>
+          </p:nvPr>
+        </p:nvSpPr>
+        <p:spPr>
+          <a:xfrm>
+            <a:off x="6119732" y="2858703"/>
+            <a:ext cx="5285791" cy="3042547"/>
+          </a:xfrm>
+        </p:spPr>
+        <p:txBody>
+          <a:bodyPr>
+            <a:normAutofit fontScale="85000" lnSpcReduction="20000"/>
+          </a:bodyPr>
+          <a:lstStyle/>
+          <a:p>
+            <a:pPr marL="0" indent="0">
+              <a:buNone/>
+            </a:pPr>
+            <a:r>
+              <a:rPr lang="de-DE" dirty="0">
+                <a:solidFill>
+                  <a:srgbClr val="FFFFFF"/>
+                </a:solidFill>
+              </a:rPr>
+              <a:t>Initialer Aufbau:</a:t>
+            </a:r>
+          </a:p>
+          <a:p>
+            <a:pPr>
+              <a:buClr>
+                <a:schemeClr val="tx2"/>
+              </a:buClr>
+            </a:pPr>
+            <a:r>
+              <a:rPr lang="de-DE" dirty="0">
+                <a:solidFill>
+                  <a:srgbClr val="FFFFFF"/>
+                </a:solidFill>
+              </a:rPr>
+              <a:t>Input-Schicht mit 1024 Input-Parametern</a:t>
+            </a:r>
+          </a:p>
+          <a:p>
+            <a:pPr>
+              <a:buClr>
+                <a:schemeClr val="tx2"/>
+              </a:buClr>
+            </a:pPr>
+            <a:r>
+              <a:rPr lang="de-DE" dirty="0">
+                <a:solidFill>
+                  <a:srgbClr val="FFFFFF"/>
+                </a:solidFill>
+              </a:rPr>
+              <a:t>Drei Hidden-Layer mit 64, 32 und 64 Neuronen, Aktivierung: ReLU</a:t>
+            </a:r>
+          </a:p>
+          <a:p>
+            <a:pPr>
+              <a:buClr>
+                <a:schemeClr val="tx2"/>
+              </a:buClr>
+            </a:pPr>
+            <a:r>
+              <a:rPr lang="de-DE" dirty="0">
+                <a:solidFill>
+                  <a:srgbClr val="FFFFFF"/>
+                </a:solidFill>
+              </a:rPr>
+              <a:t>Output-Schicht mit 43 Neuronen (analog zu 43 Label-Klassen)</a:t>
+            </a:r>
+          </a:p>
+          <a:p>
+            <a:pPr>
+              <a:buClr>
+                <a:schemeClr val="tx2"/>
+              </a:buClr>
+            </a:pPr>
+            <a:r>
+              <a:rPr lang="de-DE" dirty="0">
+                <a:solidFill>
+                  <a:srgbClr val="FFFFFF"/>
+                </a:solidFill>
+              </a:rPr>
+              <a:t>Batch-Size: 128</a:t>
+            </a:r>
+          </a:p>
+          <a:p>
+            <a:pPr>
+              <a:buClr>
+                <a:schemeClr val="tx2"/>
+              </a:buClr>
+            </a:pPr>
+            <a:r>
+              <a:rPr lang="de-DE" dirty="0">
+                <a:solidFill>
+                  <a:srgbClr val="FFFFFF"/>
+                </a:solidFill>
+              </a:rPr>
+              <a:t>Epochs: 250</a:t>
+            </a:r>
+          </a:p>
+          <a:p>
+            <a:pPr>
+              <a:buClr>
+                <a:schemeClr val="tx2"/>
+              </a:buClr>
+            </a:pPr>
+            <a:r>
+              <a:rPr lang="de-DE" dirty="0">
+                <a:solidFill>
+                  <a:srgbClr val="FFFFFF"/>
+                </a:solidFill>
+              </a:rPr>
+              <a:t>Loss: Categorical Crossentropy</a:t>
+            </a:r>
+          </a:p>
+          <a:p>
+            <a:pPr>
+              <a:buClr>
+                <a:schemeClr val="tx2"/>
+              </a:buClr>
+            </a:pPr>
+            <a:r>
+              <a:rPr lang="de-DE" dirty="0">
+                <a:solidFill>
+                  <a:srgbClr val="FFFFFF"/>
+                </a:solidFill>
+              </a:rPr>
+              <a:t>Optimizer:  ADAM (Adaptive Moment Estimation)</a:t>
+            </a:r>
+          </a:p>
+          <a:p>
+            <a:pPr>
+              <a:buClr>
+                <a:schemeClr val="tx2"/>
+              </a:buClr>
+            </a:pPr>
+            <a:r>
+              <a:rPr lang="de-DE" dirty="0">
+                <a:solidFill>
+                  <a:srgbClr val="FFFFFF"/>
+                </a:solidFill>
+              </a:rPr>
+              <a:t>Metrik: Genauigkeit (Accuracy)</a:t>
+            </a:r>
+          </a:p>
+        </p:txBody>
+      </p:sp>
+    </p:spTree>
+    <p:extLst>
+      <p:ext uri="{BB962C8B-B14F-4D97-AF65-F5344CB8AC3E}">
+        <p14:creationId xmlns:p14="http://schemas.microsoft.com/office/powerpoint/2010/main" val="54801597"/>
+      </p:ext>
+    </p:extLst>
+  </p:cSld>
+  <p:clrMapOvr>
+    <a:masterClrMapping/>
+  </p:clrMapOvr>
+</p:sld>
+</file>
+
+<file path=ppt/slides/slide5.xml><?xml version="1.0" encoding="utf-8"?>
+<p:sld xmlns:a="http://schemas.openxmlformats.org/drawingml/2006/main" xmlns:r="http://schemas.openxmlformats.org/officeDocument/2006/relationships" xmlns:p="http://schemas.openxmlformats.org/presentationml/2006/main">
+  <p:cSld>
+    <p:bg>
+      <p:bgPr>
+        <a:solidFill>
+          <a:schemeClr val="bg1">
+            <a:lumMod val="95000"/>
+          </a:schemeClr>
+        </a:solidFill>
+        <a:effectLst/>
+      </p:bgPr>
+    </p:bg>
+    <p:spTree>
+      <p:nvGrpSpPr>
+        <p:cNvPr id="1" name=""/>
+        <p:cNvGrpSpPr/>
+        <p:nvPr/>
+      </p:nvGrpSpPr>
+      <p:grpSpPr>
+        <a:xfrm>
+          <a:off x="0" y="0"/>
+          <a:ext cx="0" cy="0"/>
+          <a:chOff x="0" y="0"/>
+          <a:chExt cx="0" cy="0"/>
+        </a:xfrm>
+      </p:grpSpPr>
+      <p:sp>
+        <p:nvSpPr>
+          <p:cNvPr id="2" name="Titel 1">
+            <a:extLst>
+              <a:ext uri="{FF2B5EF4-FFF2-40B4-BE49-F238E27FC236}">
+                <a16:creationId xmlns:a16="http://schemas.microsoft.com/office/drawing/2014/main" id="{6CE4CBAA-AF40-EDF3-7A2D-6494232D04EB}"/>
+              </a:ext>
+            </a:extLst>
+          </p:cNvPr>
+          <p:cNvSpPr>
+            <a:spLocks noGrp="1"/>
+          </p:cNvSpPr>
+          <p:nvPr>
+            <p:ph type="title"/>
+          </p:nvPr>
+        </p:nvSpPr>
+        <p:spPr>
+          <a:xfrm>
+            <a:off x="640080" y="640079"/>
+            <a:ext cx="2586006" cy="5272242"/>
+          </a:xfrm>
+        </p:spPr>
+        <p:txBody>
+          <a:bodyPr>
+            <a:normAutofit/>
+          </a:bodyPr>
+          <a:lstStyle/>
+          <a:p>
+            <a:r>
+              <a:rPr lang="de-DE" sz="2000" dirty="0"/>
+              <a:t>Performance des initialen DNN</a:t>
+            </a:r>
+          </a:p>
+        </p:txBody>
+      </p:sp>
+      <p:sp>
+        <p:nvSpPr>
+          <p:cNvPr id="9" name="Content Placeholder 8">
+            <a:extLst>
+              <a:ext uri="{FF2B5EF4-FFF2-40B4-BE49-F238E27FC236}">
+                <a16:creationId xmlns:a16="http://schemas.microsoft.com/office/drawing/2014/main" id="{7BDB747D-2D7C-5C63-B2DC-C016A1BC502B}"/>
+              </a:ext>
+            </a:extLst>
+          </p:cNvPr>
+          <p:cNvSpPr>
+            <a:spLocks noGrp="1"/>
+          </p:cNvSpPr>
+          <p:nvPr>
+            <p:ph idx="1"/>
+          </p:nvPr>
+        </p:nvSpPr>
+        <p:spPr>
+          <a:xfrm>
+            <a:off x="3614468" y="640079"/>
+            <a:ext cx="7940707" cy="2834737"/>
+          </a:xfrm>
+        </p:spPr>
+        <p:txBody>
+          <a:bodyPr>
+            <a:normAutofit/>
+          </a:bodyPr>
+          <a:lstStyle/>
+          <a:p>
+            <a:r>
+              <a:rPr lang="en-US" sz="1600" noProof="1"/>
+              <a:t>Max. Training-Accuracy: 99.24%</a:t>
+            </a:r>
+          </a:p>
+          <a:p>
+            <a:r>
+              <a:rPr lang="en-US" sz="1600" noProof="1"/>
+              <a:t>Max. Validation-Accuracy: 87.82%</a:t>
+            </a:r>
+          </a:p>
+          <a:p>
+            <a:r>
+              <a:rPr lang="en-US" sz="1600" noProof="1"/>
+              <a:t>Starker </a:t>
+            </a:r>
+            <a:r>
+              <a:rPr lang="de-DE" sz="1600" noProof="1"/>
+              <a:t>Anstieg</a:t>
+            </a:r>
+            <a:r>
+              <a:rPr lang="en-US" sz="1600" noProof="1"/>
+              <a:t> des Validierungsfehlers nach ca. 30 Epochs bei gleichzeitiger Konvergenz der Training-Accuracy zu nahe 100% deutet auf starkes Overfitting hin</a:t>
+            </a:r>
+          </a:p>
+          <a:p>
+            <a:r>
+              <a:rPr lang="en-US" sz="1600" noProof="1"/>
+              <a:t>Interessant ist, dass die Validation-Accuracy trotz steigendem Fehler nahezu konstant bleibt</a:t>
+            </a:r>
+          </a:p>
+          <a:p>
+            <a:r>
+              <a:rPr lang="en-US" sz="1600" noProof="1"/>
+              <a:t>Gegenmittel: Implementieren von Early Stopping, Einführen von Regularisierung in Form von Dropout</a:t>
+            </a:r>
+          </a:p>
+        </p:txBody>
+      </p:sp>
+      <p:pic>
+        <p:nvPicPr>
+          <p:cNvPr id="5" name="Inhaltsplatzhalter 4">
+            <a:extLst>
+              <a:ext uri="{FF2B5EF4-FFF2-40B4-BE49-F238E27FC236}">
+                <a16:creationId xmlns:a16="http://schemas.microsoft.com/office/drawing/2014/main" id="{AB87267D-434B-1B91-FC33-256B6858120D}"/>
+              </a:ext>
+            </a:extLst>
+          </p:cNvPr>
+          <p:cNvPicPr>
+            <a:picLocks noChangeAspect="1"/>
+          </p:cNvPicPr>
+          <p:nvPr/>
+        </p:nvPicPr>
+        <p:blipFill>
+          <a:blip r:embed="rId2">
+            <a:extLst>
+              <a:ext uri="{96DAC541-7B7A-43D3-8B79-37D633B846F1}">
+                <asvg:svgBlip xmlns:asvg="http://schemas.microsoft.com/office/drawing/2016/SVG/main" r:embed="rId3"/>
+              </a:ext>
+            </a:extLst>
+          </a:blip>
+          <a:stretch>
+            <a:fillRect/>
+          </a:stretch>
+        </p:blipFill>
+        <p:spPr>
+          <a:xfrm>
+            <a:off x="3659422" y="3156096"/>
+            <a:ext cx="7892498" cy="2756225"/>
+          </a:xfrm>
+          <a:prstGeom prst="rect">
+            <a:avLst/>
+          </a:prstGeom>
+          <a:ln w="31750" cap="sq">
+            <a:solidFill>
+              <a:srgbClr val="FFFFFF"/>
+            </a:solidFill>
+            <a:miter lim="800000"/>
+          </a:ln>
+        </p:spPr>
+      </p:pic>
+    </p:spTree>
+    <p:extLst>
+      <p:ext uri="{BB962C8B-B14F-4D97-AF65-F5344CB8AC3E}">
+        <p14:creationId xmlns:p14="http://schemas.microsoft.com/office/powerpoint/2010/main" val="1697106170"/>
+      </p:ext>
+    </p:extLst>
+  </p:cSld>
+  <p:clrMapOvr>
+    <a:masterClrMapping/>
+  </p:clrMapOvr>
+</p:sld>
+</file>
+
+<file path=ppt/slides/slide6.xml><?xml version="1.0" encoding="utf-8"?>
+<p:sld xmlns:a="http://schemas.openxmlformats.org/drawingml/2006/main" xmlns:r="http://schemas.openxmlformats.org/officeDocument/2006/relationships" xmlns:p="http://schemas.openxmlformats.org/presentationml/2006/main">
+  <p:cSld>
+    <p:bg>
+      <p:bgPr>
+        <a:solidFill>
+          <a:schemeClr val="bg1">
+            <a:lumMod val="95000"/>
+          </a:schemeClr>
+        </a:solidFill>
+        <a:effectLst/>
+      </p:bgPr>
+    </p:bg>
+    <p:spTree>
+      <p:nvGrpSpPr>
+        <p:cNvPr id="1" name=""/>
+        <p:cNvGrpSpPr/>
+        <p:nvPr/>
+      </p:nvGrpSpPr>
+      <p:grpSpPr>
+        <a:xfrm>
+          <a:off x="0" y="0"/>
+          <a:ext cx="0" cy="0"/>
+          <a:chOff x="0" y="0"/>
+          <a:chExt cx="0" cy="0"/>
+        </a:xfrm>
+      </p:grpSpPr>
+      <p:sp>
+        <p:nvSpPr>
+          <p:cNvPr id="2" name="Titel 1">
+            <a:extLst>
+              <a:ext uri="{FF2B5EF4-FFF2-40B4-BE49-F238E27FC236}">
+                <a16:creationId xmlns:a16="http://schemas.microsoft.com/office/drawing/2014/main" id="{8A045A54-B225-5F71-ABDC-EA01A18BEFEE}"/>
+              </a:ext>
+            </a:extLst>
+          </p:cNvPr>
+          <p:cNvSpPr>
+            <a:spLocks noGrp="1"/>
+          </p:cNvSpPr>
+          <p:nvPr>
+            <p:ph type="title"/>
+          </p:nvPr>
+        </p:nvSpPr>
+        <p:spPr>
+          <a:xfrm>
+            <a:off x="804672" y="964692"/>
+            <a:ext cx="3066937" cy="1188720"/>
+          </a:xfrm>
+        </p:spPr>
+        <p:txBody>
+          <a:bodyPr>
+            <a:normAutofit fontScale="90000"/>
+          </a:bodyPr>
+          <a:lstStyle/>
+          <a:p>
+            <a:r>
+              <a:rPr lang="de-DE" dirty="0"/>
+              <a:t>Early Stopping in initialem dnn</a:t>
+            </a:r>
+          </a:p>
+        </p:txBody>
+      </p:sp>
+      <p:sp>
+        <p:nvSpPr>
+          <p:cNvPr id="9" name="Content Placeholder 8">
+            <a:extLst>
+              <a:ext uri="{FF2B5EF4-FFF2-40B4-BE49-F238E27FC236}">
+                <a16:creationId xmlns:a16="http://schemas.microsoft.com/office/drawing/2014/main" id="{BA538CC7-948F-EFA5-8453-F5C1FD564967}"/>
+              </a:ext>
+            </a:extLst>
+          </p:cNvPr>
+          <p:cNvSpPr>
+            <a:spLocks noGrp="1"/>
+          </p:cNvSpPr>
+          <p:nvPr>
+            <p:ph idx="1"/>
+          </p:nvPr>
+        </p:nvSpPr>
+        <p:spPr>
+          <a:xfrm>
+            <a:off x="803244" y="2638044"/>
+            <a:ext cx="3063765" cy="3263206"/>
+          </a:xfrm>
+        </p:spPr>
+        <p:txBody>
+          <a:bodyPr>
+            <a:normAutofit fontScale="92500" lnSpcReduction="20000"/>
+          </a:bodyPr>
+          <a:lstStyle/>
+          <a:p>
+            <a:r>
+              <a:rPr lang="en-US" noProof="1"/>
+              <a:t>Early Stopping Parameter:</a:t>
+            </a:r>
+          </a:p>
+          <a:p>
+            <a:pPr lvl="1"/>
+            <a:r>
+              <a:rPr lang="en-US" noProof="1"/>
+              <a:t>Min. Delta: 0.02</a:t>
+            </a:r>
+          </a:p>
+          <a:p>
+            <a:pPr lvl="1"/>
+            <a:r>
+              <a:rPr lang="en-US" noProof="1"/>
+              <a:t>Patience: 12</a:t>
+            </a:r>
+          </a:p>
+          <a:p>
+            <a:pPr lvl="1"/>
+            <a:r>
+              <a:rPr lang="en-US" noProof="1"/>
+              <a:t>Starte bei Epoch 15</a:t>
+            </a:r>
+          </a:p>
+          <a:p>
+            <a:pPr lvl="1"/>
+            <a:r>
+              <a:rPr lang="en-US" noProof="1"/>
+              <a:t>Restore weights: true</a:t>
+            </a:r>
+          </a:p>
+          <a:p>
+            <a:r>
+              <a:rPr lang="en-US" noProof="1"/>
+              <a:t>Ergebnis:</a:t>
+            </a:r>
+          </a:p>
+          <a:p>
+            <a:pPr lvl="1"/>
+            <a:r>
+              <a:rPr lang="en-US" noProof="1"/>
+              <a:t>Early Stopping nach 28 Epochs</a:t>
+            </a:r>
+          </a:p>
+          <a:p>
+            <a:pPr lvl="1"/>
+            <a:r>
+              <a:rPr lang="en-US" noProof="1"/>
+              <a:t>Best weights nach 16 Epochs wiederhergestellt</a:t>
+            </a:r>
+          </a:p>
+          <a:p>
+            <a:pPr lvl="1"/>
+            <a:r>
+              <a:rPr lang="en-US" noProof="1"/>
+              <a:t>Accuracies: 96.01% Training, 85.27% Validation</a:t>
+            </a:r>
+          </a:p>
+        </p:txBody>
+      </p:sp>
+      <p:sp>
+        <p:nvSpPr>
+          <p:cNvPr id="12" name="Rectangle 11">
+            <a:extLst>
+              <a:ext uri="{FF2B5EF4-FFF2-40B4-BE49-F238E27FC236}">
+                <a16:creationId xmlns:a16="http://schemas.microsoft.com/office/drawing/2014/main" id="{6515FC82-3453-4CBE-8895-4CCFF339529E}"/>
+              </a:ext>
+              <a:ext uri="{C183D7F6-B498-43B3-948B-1728B52AA6E4}">
+                <adec:decorative xmlns:adec="http://schemas.microsoft.com/office/drawing/2017/decorative" val="1"/>
+              </a:ext>
+            </a:extLst>
+          </p:cNvPr>
+          <p:cNvSpPr>
+            <a:spLocks noGrp="1" noRot="1" noChangeAspect="1" noMove="1" noResize="1" noEditPoints="1" noAdjustHandles="1" noChangeArrowheads="1" noChangeShapeType="1" noTextEdit="1"/>
+          </p:cNvSpPr>
+          <p:nvPr>
+            <p:extLst>
+              <p:ext uri="{386F3935-93C4-4BCD-93E2-E3B085C9AB24}">
+                <p16:designElem xmlns:p16="http://schemas.microsoft.com/office/powerpoint/2015/main" val="1"/>
+              </p:ext>
+            </p:extLst>
+          </p:nvPr>
+        </p:nvSpPr>
+        <p:spPr>
+          <a:xfrm>
+            <a:off x="4494182" y="964692"/>
+            <a:ext cx="6885432" cy="4936558"/>
+          </a:xfrm>
+          <a:prstGeom prst="rect">
+            <a:avLst/>
+          </a:prstGeom>
+          <a:noFill/>
+          <a:ln w="31750" cap="sq">
+            <a:solidFill>
+              <a:srgbClr val="FFFFFF"/>
+            </a:solidFill>
+            <a:miter lim="800000"/>
+          </a:ln>
+        </p:spPr>
+        <p:style>
+          <a:lnRef idx="2">
+            <a:schemeClr val="accent1">
+              <a:shade val="50000"/>
+            </a:schemeClr>
+          </a:lnRef>
+          <a:fillRef idx="1">
+            <a:schemeClr val="accent1"/>
+          </a:fillRef>
+          <a:effectRef idx="0">
+            <a:schemeClr val="accent1"/>
+          </a:effectRef>
+          <a:fontRef idx="minor">
+            <a:schemeClr val="lt1"/>
+          </a:fontRef>
+        </p:style>
+        <p:txBody>
+          <a:bodyPr rtlCol="0" anchor="ctr"/>
+          <a:lstStyle/>
+          <a:p>
+            <a:pPr algn="ctr"/>
+            <a:endParaRPr lang="en-US" dirty="0"/>
+          </a:p>
+        </p:txBody>
+      </p:sp>
+      <p:sp>
+        <p:nvSpPr>
+          <p:cNvPr id="14" name="Rectangle 13">
+            <a:extLst>
+              <a:ext uri="{FF2B5EF4-FFF2-40B4-BE49-F238E27FC236}">
+                <a16:creationId xmlns:a16="http://schemas.microsoft.com/office/drawing/2014/main" id="{C5FD847B-65C0-4027-8DFC-70CB424514F8}"/>
+              </a:ext>
+              <a:ext uri="{C183D7F6-B498-43B3-948B-1728B52AA6E4}">
+                <adec:decorative xmlns:adec="http://schemas.microsoft.com/office/drawing/2017/decorative" val="1"/>
+              </a:ext>
+            </a:extLst>
+          </p:cNvPr>
+          <p:cNvSpPr>
+            <a:spLocks noGrp="1" noRot="1" noChangeAspect="1" noMove="1" noResize="1" noEditPoints="1" noAdjustHandles="1" noChangeArrowheads="1" noChangeShapeType="1" noTextEdit="1"/>
+          </p:cNvSpPr>
+          <p:nvPr>
+            <p:extLst>
+              <p:ext uri="{386F3935-93C4-4BCD-93E2-E3B085C9AB24}">
+                <p16:designElem xmlns:p16="http://schemas.microsoft.com/office/powerpoint/2015/main" val="1"/>
+              </p:ext>
+            </p:extLst>
+          </p:nvPr>
+        </p:nvSpPr>
+        <p:spPr>
+          <a:xfrm>
+            <a:off x="4657802" y="1128683"/>
+            <a:ext cx="6558192" cy="4608576"/>
+          </a:xfrm>
+          <a:prstGeom prst="rect">
+            <a:avLst/>
+          </a:prstGeom>
+          <a:solidFill>
+            <a:srgbClr val="FFFFFF"/>
+          </a:solidFill>
+          <a:ln>
+            <a:noFill/>
+          </a:ln>
+        </p:spPr>
+        <p:style>
+          <a:lnRef idx="2">
+            <a:schemeClr val="accent1">
+              <a:shade val="50000"/>
+            </a:schemeClr>
+          </a:lnRef>
+          <a:fillRef idx="1">
+            <a:schemeClr val="accent1"/>
+          </a:fillRef>
+          <a:effectRef idx="0">
+            <a:schemeClr val="accent1"/>
+          </a:effectRef>
+          <a:fontRef idx="minor">
+            <a:schemeClr val="lt1"/>
+          </a:fontRef>
+        </p:style>
+        <p:txBody>
+          <a:bodyPr rtlCol="0" anchor="ctr"/>
+          <a:lstStyle/>
+          <a:p>
+            <a:pPr algn="ctr"/>
+            <a:endParaRPr lang="en-US"/>
+          </a:p>
+        </p:txBody>
+      </p:sp>
+      <p:pic>
+        <p:nvPicPr>
+          <p:cNvPr id="5" name="Inhaltsplatzhalter 4">
+            <a:extLst>
+              <a:ext uri="{FF2B5EF4-FFF2-40B4-BE49-F238E27FC236}">
+                <a16:creationId xmlns:a16="http://schemas.microsoft.com/office/drawing/2014/main" id="{99AD0826-8DA1-E212-B8CA-43C9149F9872}"/>
+              </a:ext>
+            </a:extLst>
+          </p:cNvPr>
+          <p:cNvPicPr>
+            <a:picLocks noChangeAspect="1"/>
+          </p:cNvPicPr>
+          <p:nvPr/>
+        </p:nvPicPr>
+        <p:blipFill>
+          <a:blip r:embed="rId2">
+            <a:extLst>
+              <a:ext uri="{96DAC541-7B7A-43D3-8B79-37D633B846F1}">
+                <asvg:svgBlip xmlns:asvg="http://schemas.microsoft.com/office/drawing/2016/SVG/main" r:embed="rId3"/>
+              </a:ext>
+            </a:extLst>
+          </a:blip>
+          <a:stretch>
+            <a:fillRect/>
+          </a:stretch>
+        </p:blipFill>
+        <p:spPr>
+          <a:xfrm>
+            <a:off x="4823366" y="2365879"/>
+            <a:ext cx="6227064" cy="2134184"/>
+          </a:xfrm>
+          <a:prstGeom prst="rect">
+            <a:avLst/>
+          </a:prstGeom>
+        </p:spPr>
+      </p:pic>
+    </p:spTree>
+    <p:extLst>
+      <p:ext uri="{BB962C8B-B14F-4D97-AF65-F5344CB8AC3E}">
+        <p14:creationId xmlns:p14="http://schemas.microsoft.com/office/powerpoint/2010/main" val="671638338"/>
+      </p:ext>
+    </p:extLst>
+  </p:cSld>
+  <p:clrMapOvr>
+    <a:masterClrMapping/>
+  </p:clrMapOvr>
+</p:sld>
+</file>
+
+<file path=ppt/slides/slide7.xml><?xml version="1.0" encoding="utf-8"?>
+<p:sld xmlns:a="http://schemas.openxmlformats.org/drawingml/2006/main" xmlns:r="http://schemas.openxmlformats.org/officeDocument/2006/relationships" xmlns:p="http://schemas.openxmlformats.org/presentationml/2006/main">
+  <p:cSld>
+    <p:bg>
+      <p:bgPr>
+        <a:solidFill>
+          <a:schemeClr val="bg1">
+            <a:lumMod val="95000"/>
+          </a:schemeClr>
+        </a:solidFill>
+        <a:effectLst/>
+      </p:bgPr>
+    </p:bg>
+    <p:spTree>
+      <p:nvGrpSpPr>
+        <p:cNvPr id="1" name=""/>
+        <p:cNvGrpSpPr/>
+        <p:nvPr/>
+      </p:nvGrpSpPr>
+      <p:grpSpPr>
+        <a:xfrm>
+          <a:off x="0" y="0"/>
+          <a:ext cx="0" cy="0"/>
+          <a:chOff x="0" y="0"/>
+          <a:chExt cx="0" cy="0"/>
+        </a:xfrm>
+      </p:grpSpPr>
+      <p:sp useBgFill="1">
+        <p:nvSpPr>
+          <p:cNvPr id="18" name="Rectangle 11">
+            <a:extLst>
+              <a:ext uri="{FF2B5EF4-FFF2-40B4-BE49-F238E27FC236}">
+                <a16:creationId xmlns:a16="http://schemas.microsoft.com/office/drawing/2014/main" id="{1660E788-AFA9-4A1B-9991-6AA74632A15B}"/>
+              </a:ext>
+              <a:ext uri="{C183D7F6-B498-43B3-948B-1728B52AA6E4}">
+                <adec:decorative xmlns:adec="http://schemas.microsoft.com/office/drawing/2017/decorative" val="1"/>
+              </a:ext>
+            </a:extLst>
+          </p:cNvPr>
+          <p:cNvSpPr>
+            <a:spLocks noGrp="1" noRot="1" noChangeAspect="1" noMove="1" noResize="1" noEditPoints="1" noAdjustHandles="1" noChangeArrowheads="1" noChangeShapeType="1" noTextEdit="1"/>
+          </p:cNvSpPr>
+          <p:nvPr>
+            <p:extLst>
+              <p:ext uri="{386F3935-93C4-4BCD-93E2-E3B085C9AB24}">
+                <p16:designElem xmlns:p16="http://schemas.microsoft.com/office/powerpoint/2015/main" val="1"/>
+              </p:ext>
+            </p:extLst>
+          </p:nvPr>
+        </p:nvSpPr>
+        <p:spPr>
+          <a:xfrm>
+            <a:off x="1" y="0"/>
+            <a:ext cx="12191999" cy="6858000"/>
+          </a:xfrm>
+          <a:prstGeom prst="rect">
+            <a:avLst/>
+          </a:prstGeom>
+          <a:ln>
+            <a:noFill/>
+          </a:ln>
+        </p:spPr>
+        <p:style>
+          <a:lnRef idx="2">
+            <a:schemeClr val="accent1">
+              <a:shade val="50000"/>
+            </a:schemeClr>
+          </a:lnRef>
+          <a:fillRef idx="1">
+            <a:schemeClr val="accent1"/>
+          </a:fillRef>
+          <a:effectRef idx="0">
+            <a:schemeClr val="accent1"/>
+          </a:effectRef>
+          <a:fontRef idx="minor">
+            <a:schemeClr val="lt1"/>
+          </a:fontRef>
+        </p:style>
+        <p:txBody>
+          <a:bodyPr rtlCol="0" anchor="ctr"/>
+          <a:lstStyle/>
+          <a:p>
+            <a:pPr algn="ctr"/>
+            <a:endParaRPr lang="en-US"/>
+          </a:p>
+        </p:txBody>
+      </p:sp>
+      <p:sp>
+        <p:nvSpPr>
+          <p:cNvPr id="19" name="Rectangle 13">
+            <a:extLst>
+              <a:ext uri="{FF2B5EF4-FFF2-40B4-BE49-F238E27FC236}">
+                <a16:creationId xmlns:a16="http://schemas.microsoft.com/office/drawing/2014/main" id="{867D4867-5BA7-4462-B2F6-A23F4A622AA7}"/>
+              </a:ext>
+              <a:ext uri="{C183D7F6-B498-43B3-948B-1728B52AA6E4}">
+                <adec:decorative xmlns:adec="http://schemas.microsoft.com/office/drawing/2017/decorative" val="1"/>
+              </a:ext>
+            </a:extLst>
+          </p:cNvPr>
+          <p:cNvSpPr>
+            <a:spLocks noGrp="1" noRot="1" noChangeAspect="1" noMove="1" noResize="1" noEditPoints="1" noAdjustHandles="1" noChangeArrowheads="1" noChangeShapeType="1" noTextEdit="1"/>
+          </p:cNvSpPr>
+          <p:nvPr>
+            <p:extLst>
+              <p:ext uri="{386F3935-93C4-4BCD-93E2-E3B085C9AB24}">
+                <p16:designElem xmlns:p16="http://schemas.microsoft.com/office/powerpoint/2015/main" val="1"/>
+              </p:ext>
+            </p:extLst>
+          </p:nvPr>
+        </p:nvSpPr>
+        <p:spPr>
+          <a:xfrm>
+            <a:off x="7537704" y="0"/>
+            <a:ext cx="4654296" cy="6858000"/>
+          </a:xfrm>
+          <a:prstGeom prst="rect">
+            <a:avLst/>
+          </a:prstGeom>
+          <a:solidFill>
+            <a:schemeClr val="tx2"/>
+          </a:solidFill>
+          <a:ln>
+            <a:noFill/>
+          </a:ln>
+        </p:spPr>
+        <p:style>
+          <a:lnRef idx="0">
+            <a:scrgbClr r="0" g="0" b="0"/>
+          </a:lnRef>
+          <a:fillRef idx="0">
+            <a:scrgbClr r="0" g="0" b="0"/>
+          </a:fillRef>
+          <a:effectRef idx="0">
+            <a:scrgbClr r="0" g="0" b="0"/>
+          </a:effectRef>
+          <a:fontRef idx="minor">
+            <a:schemeClr val="lt1"/>
+          </a:fontRef>
+        </p:style>
+        <p:txBody>
+          <a:bodyPr rtlCol="0" anchor="ctr"/>
+          <a:lstStyle/>
+          <a:p>
+            <a:pPr algn="ctr"/>
+            <a:endParaRPr lang="en-US"/>
+          </a:p>
+        </p:txBody>
+      </p:sp>
+      <p:sp>
+        <p:nvSpPr>
+          <p:cNvPr id="2" name="Titel 1">
+            <a:extLst>
+              <a:ext uri="{FF2B5EF4-FFF2-40B4-BE49-F238E27FC236}">
+                <a16:creationId xmlns:a16="http://schemas.microsoft.com/office/drawing/2014/main" id="{E7798EA5-C006-F338-CCBF-8321C48EDEF3}"/>
+              </a:ext>
+            </a:extLst>
+          </p:cNvPr>
+          <p:cNvSpPr>
+            <a:spLocks noGrp="1"/>
+          </p:cNvSpPr>
+          <p:nvPr>
+            <p:ph type="title"/>
+          </p:nvPr>
+        </p:nvSpPr>
+        <p:spPr>
+          <a:xfrm>
+            <a:off x="8184559" y="643467"/>
+            <a:ext cx="3363974" cy="1728044"/>
+          </a:xfrm>
+          <a:noFill/>
+          <a:ln>
+            <a:solidFill>
+              <a:schemeClr val="bg1"/>
+            </a:solidFill>
+          </a:ln>
+        </p:spPr>
+        <p:txBody>
+          <a:bodyPr wrap="square">
+            <a:normAutofit/>
+          </a:bodyPr>
+          <a:lstStyle/>
+          <a:p>
+            <a:r>
+              <a:rPr lang="de-DE">
+                <a:solidFill>
+                  <a:schemeClr val="bg1"/>
+                </a:solidFill>
+              </a:rPr>
+              <a:t>Einführung von Dropout</a:t>
+            </a:r>
+          </a:p>
+        </p:txBody>
+      </p:sp>
+      <p:pic>
+        <p:nvPicPr>
+          <p:cNvPr id="5" name="Inhaltsplatzhalter 4">
+            <a:extLst>
+              <a:ext uri="{FF2B5EF4-FFF2-40B4-BE49-F238E27FC236}">
+                <a16:creationId xmlns:a16="http://schemas.microsoft.com/office/drawing/2014/main" id="{FEBF2BAB-89C6-0C8F-D613-3C95D6216AE9}"/>
+              </a:ext>
+            </a:extLst>
+          </p:cNvPr>
+          <p:cNvPicPr>
+            <a:picLocks noChangeAspect="1"/>
+          </p:cNvPicPr>
+          <p:nvPr/>
+        </p:nvPicPr>
+        <p:blipFill>
+          <a:blip r:embed="rId2">
+            <a:extLst>
+              <a:ext uri="{96DAC541-7B7A-43D3-8B79-37D633B846F1}">
+                <asvg:svgBlip xmlns:asvg="http://schemas.microsoft.com/office/drawing/2016/SVG/main" r:embed="rId3"/>
+              </a:ext>
+            </a:extLst>
+          </a:blip>
+          <a:stretch>
+            <a:fillRect/>
+          </a:stretch>
+        </p:blipFill>
+        <p:spPr>
+          <a:xfrm>
+            <a:off x="265042" y="2225917"/>
+            <a:ext cx="6963204" cy="2406166"/>
+          </a:xfrm>
+          <a:prstGeom prst="rect">
+            <a:avLst/>
+          </a:prstGeom>
+        </p:spPr>
+      </p:pic>
+      <p:sp>
+        <p:nvSpPr>
+          <p:cNvPr id="9" name="Content Placeholder 8">
+            <a:extLst>
+              <a:ext uri="{FF2B5EF4-FFF2-40B4-BE49-F238E27FC236}">
+                <a16:creationId xmlns:a16="http://schemas.microsoft.com/office/drawing/2014/main" id="{68295678-497A-1ADB-050E-1921D8D9FACC}"/>
+              </a:ext>
+            </a:extLst>
+          </p:cNvPr>
+          <p:cNvSpPr>
+            <a:spLocks noGrp="1"/>
+          </p:cNvSpPr>
+          <p:nvPr>
+            <p:ph idx="1"/>
+          </p:nvPr>
+        </p:nvSpPr>
+        <p:spPr>
+          <a:xfrm>
+            <a:off x="8184558" y="2638044"/>
+            <a:ext cx="3363974" cy="3415622"/>
+          </a:xfrm>
+        </p:spPr>
+        <p:txBody>
+          <a:bodyPr>
+            <a:normAutofit/>
+          </a:bodyPr>
+          <a:lstStyle/>
+          <a:p>
+            <a:r>
+              <a:rPr lang="en-US" dirty="0" err="1">
+                <a:solidFill>
+                  <a:schemeClr val="bg1"/>
+                </a:solidFill>
+              </a:rPr>
+              <a:t>Ergebnis</a:t>
+            </a:r>
+            <a:r>
+              <a:rPr lang="en-US" dirty="0">
+                <a:solidFill>
+                  <a:schemeClr val="bg1"/>
+                </a:solidFill>
+              </a:rPr>
+              <a:t>:</a:t>
+            </a:r>
+          </a:p>
+          <a:p>
+            <a:pPr lvl="1"/>
+            <a:r>
+              <a:rPr lang="en-US" dirty="0">
+                <a:solidFill>
+                  <a:schemeClr val="bg1"/>
+                </a:solidFill>
+              </a:rPr>
+              <a:t>Sehr </a:t>
+            </a:r>
+            <a:r>
+              <a:rPr lang="en-US" dirty="0" err="1">
+                <a:solidFill>
+                  <a:schemeClr val="bg1"/>
+                </a:solidFill>
+              </a:rPr>
+              <a:t>hoher</a:t>
+            </a:r>
+            <a:r>
+              <a:rPr lang="en-US" dirty="0">
+                <a:solidFill>
+                  <a:schemeClr val="bg1"/>
+                </a:solidFill>
+              </a:rPr>
+              <a:t> </a:t>
+            </a:r>
+            <a:r>
+              <a:rPr lang="en-US" dirty="0" err="1">
+                <a:solidFill>
+                  <a:schemeClr val="bg1"/>
+                </a:solidFill>
+              </a:rPr>
+              <a:t>Fehler</a:t>
+            </a:r>
+            <a:endParaRPr lang="en-US" dirty="0">
+              <a:solidFill>
+                <a:schemeClr val="bg1"/>
+              </a:solidFill>
+            </a:endParaRPr>
+          </a:p>
+          <a:p>
+            <a:pPr lvl="1"/>
+            <a:r>
+              <a:rPr lang="en-US" dirty="0" err="1">
+                <a:solidFill>
+                  <a:schemeClr val="bg1"/>
+                </a:solidFill>
+              </a:rPr>
+              <a:t>Genauigkeit</a:t>
+            </a:r>
+            <a:r>
+              <a:rPr lang="en-US" dirty="0">
+                <a:solidFill>
+                  <a:schemeClr val="bg1"/>
+                </a:solidFill>
+              </a:rPr>
+              <a:t> </a:t>
+            </a:r>
+            <a:r>
+              <a:rPr lang="en-US" dirty="0" err="1">
+                <a:solidFill>
+                  <a:schemeClr val="bg1"/>
+                </a:solidFill>
+              </a:rPr>
+              <a:t>unter</a:t>
+            </a:r>
+            <a:r>
+              <a:rPr lang="en-US" dirty="0">
+                <a:solidFill>
+                  <a:schemeClr val="bg1"/>
+                </a:solidFill>
+              </a:rPr>
+              <a:t> 10%</a:t>
+            </a:r>
+          </a:p>
+          <a:p>
+            <a:r>
+              <a:rPr lang="en-US" dirty="0" err="1">
+                <a:solidFill>
+                  <a:schemeClr val="bg1"/>
+                </a:solidFill>
+              </a:rPr>
+              <a:t>Folgerung</a:t>
+            </a:r>
+            <a:r>
+              <a:rPr lang="en-US" dirty="0">
+                <a:solidFill>
+                  <a:schemeClr val="bg1"/>
+                </a:solidFill>
+              </a:rPr>
+              <a:t>:</a:t>
+            </a:r>
+          </a:p>
+          <a:p>
+            <a:pPr lvl="1"/>
+            <a:r>
+              <a:rPr lang="en-US" dirty="0">
+                <a:solidFill>
+                  <a:schemeClr val="bg1"/>
+                </a:solidFill>
+              </a:rPr>
+              <a:t>Zu </a:t>
+            </a:r>
+            <a:r>
+              <a:rPr lang="en-US" dirty="0" err="1">
+                <a:solidFill>
+                  <a:schemeClr val="bg1"/>
+                </a:solidFill>
+              </a:rPr>
+              <a:t>geringe</a:t>
+            </a:r>
+            <a:r>
+              <a:rPr lang="en-US" dirty="0">
+                <a:solidFill>
+                  <a:schemeClr val="bg1"/>
+                </a:solidFill>
+              </a:rPr>
+              <a:t> </a:t>
+            </a:r>
+            <a:r>
+              <a:rPr lang="en-US" dirty="0" err="1">
+                <a:solidFill>
+                  <a:schemeClr val="bg1"/>
+                </a:solidFill>
+              </a:rPr>
+              <a:t>Anzahl</a:t>
+            </a:r>
+            <a:r>
+              <a:rPr lang="en-US" dirty="0">
+                <a:solidFill>
+                  <a:schemeClr val="bg1"/>
+                </a:solidFill>
+              </a:rPr>
+              <a:t> an </a:t>
+            </a:r>
+            <a:r>
+              <a:rPr lang="en-US" dirty="0" err="1">
+                <a:solidFill>
+                  <a:schemeClr val="bg1"/>
+                </a:solidFill>
+              </a:rPr>
+              <a:t>Neuronen</a:t>
+            </a:r>
+            <a:r>
+              <a:rPr lang="en-US" dirty="0">
+                <a:solidFill>
+                  <a:schemeClr val="bg1"/>
+                </a:solidFill>
+              </a:rPr>
+              <a:t> </a:t>
+            </a:r>
+            <a:r>
+              <a:rPr lang="en-US" dirty="0" err="1">
+                <a:solidFill>
+                  <a:schemeClr val="bg1"/>
+                </a:solidFill>
+              </a:rPr>
+              <a:t>im</a:t>
+            </a:r>
+            <a:r>
+              <a:rPr lang="en-US" dirty="0">
+                <a:solidFill>
+                  <a:schemeClr val="bg1"/>
+                </a:solidFill>
+              </a:rPr>
+              <a:t> </a:t>
+            </a:r>
+            <a:r>
+              <a:rPr lang="en-US" dirty="0" err="1">
+                <a:solidFill>
+                  <a:schemeClr val="bg1"/>
+                </a:solidFill>
+              </a:rPr>
+              <a:t>Netz</a:t>
+            </a:r>
+            <a:r>
+              <a:rPr lang="en-US" dirty="0">
+                <a:solidFill>
+                  <a:schemeClr val="bg1"/>
+                </a:solidFill>
+              </a:rPr>
+              <a:t> um den Dropout </a:t>
+            </a:r>
+            <a:r>
+              <a:rPr lang="en-US" dirty="0" err="1">
+                <a:solidFill>
+                  <a:schemeClr val="bg1"/>
+                </a:solidFill>
+              </a:rPr>
+              <a:t>zu</a:t>
+            </a:r>
+            <a:r>
+              <a:rPr lang="en-US" dirty="0">
+                <a:solidFill>
+                  <a:schemeClr val="bg1"/>
+                </a:solidFill>
+              </a:rPr>
+              <a:t> “</a:t>
+            </a:r>
+            <a:r>
+              <a:rPr lang="en-US" dirty="0" err="1">
+                <a:solidFill>
+                  <a:schemeClr val="bg1"/>
+                </a:solidFill>
+              </a:rPr>
+              <a:t>verkraften</a:t>
+            </a:r>
+            <a:r>
+              <a:rPr lang="en-US" dirty="0">
+                <a:solidFill>
+                  <a:schemeClr val="bg1"/>
+                </a:solidFill>
+              </a:rPr>
+              <a:t>”</a:t>
+            </a:r>
+            <a:br>
+              <a:rPr lang="en-US" dirty="0">
+                <a:solidFill>
+                  <a:schemeClr val="bg1"/>
+                </a:solidFill>
+              </a:rPr>
+            </a:br>
+            <a:r>
+              <a:rPr lang="en-US" dirty="0">
+                <a:solidFill>
+                  <a:schemeClr val="bg1"/>
+                </a:solidFill>
+                <a:sym typeface="Wingdings" pitchFamily="2" charset="2"/>
+              </a:rPr>
+              <a:t> </a:t>
+            </a:r>
+            <a:r>
+              <a:rPr lang="en-US" dirty="0" err="1">
+                <a:solidFill>
+                  <a:schemeClr val="bg1"/>
+                </a:solidFill>
+                <a:sym typeface="Wingdings" pitchFamily="2" charset="2"/>
+              </a:rPr>
+              <a:t>Erhöhen</a:t>
+            </a:r>
+            <a:r>
+              <a:rPr lang="en-US" dirty="0">
+                <a:solidFill>
+                  <a:schemeClr val="bg1"/>
+                </a:solidFill>
+                <a:sym typeface="Wingdings" pitchFamily="2" charset="2"/>
+              </a:rPr>
+              <a:t> der </a:t>
+            </a:r>
+            <a:r>
+              <a:rPr lang="en-US" dirty="0" err="1">
+                <a:solidFill>
+                  <a:schemeClr val="bg1"/>
+                </a:solidFill>
+                <a:sym typeface="Wingdings" pitchFamily="2" charset="2"/>
+              </a:rPr>
+              <a:t>Anzahl</a:t>
+            </a:r>
+            <a:r>
+              <a:rPr lang="en-US" dirty="0">
+                <a:solidFill>
+                  <a:schemeClr val="bg1"/>
+                </a:solidFill>
+                <a:sym typeface="Wingdings" pitchFamily="2" charset="2"/>
+              </a:rPr>
+              <a:t> an </a:t>
+            </a:r>
+            <a:r>
+              <a:rPr lang="en-US" dirty="0" err="1">
+                <a:solidFill>
+                  <a:schemeClr val="bg1"/>
+                </a:solidFill>
+                <a:sym typeface="Wingdings" pitchFamily="2" charset="2"/>
+              </a:rPr>
+              <a:t>Neuronen</a:t>
+            </a:r>
+            <a:endParaRPr lang="en-US" dirty="0">
+              <a:solidFill>
+                <a:schemeClr val="bg1"/>
+              </a:solidFill>
+            </a:endParaRPr>
+          </a:p>
+        </p:txBody>
+      </p:sp>
+    </p:spTree>
+    <p:extLst>
+      <p:ext uri="{BB962C8B-B14F-4D97-AF65-F5344CB8AC3E}">
+        <p14:creationId xmlns:p14="http://schemas.microsoft.com/office/powerpoint/2010/main" val="1322663303"/>
+      </p:ext>
+    </p:extLst>
+  </p:cSld>
+  <p:clrMapOvr>
+    <a:masterClrMapping/>
+  </p:clrMapOvr>
+</p:sld>
+</file>
+
+<file path=ppt/slides/slide8.xml><?xml version="1.0" encoding="utf-8"?>
+<p:sld xmlns:a="http://schemas.openxmlformats.org/drawingml/2006/main" xmlns:r="http://schemas.openxmlformats.org/officeDocument/2006/relationships" xmlns:p="http://schemas.openxmlformats.org/presentationml/2006/main">
+  <p:cSld>
+    <p:bg>
+      <p:bgPr>
+        <a:solidFill>
+          <a:schemeClr val="bg1">
+            <a:lumMod val="95000"/>
+          </a:schemeClr>
+        </a:solidFill>
+        <a:effectLst/>
+      </p:bgPr>
+    </p:bg>
+    <p:spTree>
+      <p:nvGrpSpPr>
+        <p:cNvPr id="1" name=""/>
+        <p:cNvGrpSpPr/>
+        <p:nvPr/>
+      </p:nvGrpSpPr>
+      <p:grpSpPr>
+        <a:xfrm>
+          <a:off x="0" y="0"/>
+          <a:ext cx="0" cy="0"/>
+          <a:chOff x="0" y="0"/>
+          <a:chExt cx="0" cy="0"/>
+        </a:xfrm>
+      </p:grpSpPr>
+      <p:sp useBgFill="1">
+        <p:nvSpPr>
+          <p:cNvPr id="10" name="Rectangle 9">
+            <a:extLst>
+              <a:ext uri="{FF2B5EF4-FFF2-40B4-BE49-F238E27FC236}">
+                <a16:creationId xmlns:a16="http://schemas.microsoft.com/office/drawing/2014/main" id="{1660E788-AFA9-4A1B-9991-6AA74632A15B}"/>
+              </a:ext>
+              <a:ext uri="{C183D7F6-B498-43B3-948B-1728B52AA6E4}">
+                <adec:decorative xmlns:adec="http://schemas.microsoft.com/office/drawing/2017/decorative" val="1"/>
+              </a:ext>
+            </a:extLst>
+          </p:cNvPr>
+          <p:cNvSpPr>
+            <a:spLocks noGrp="1" noRot="1" noChangeAspect="1" noMove="1" noResize="1" noEditPoints="1" noAdjustHandles="1" noChangeArrowheads="1" noChangeShapeType="1" noTextEdit="1"/>
+          </p:cNvSpPr>
+          <p:nvPr>
+            <p:extLst>
+              <p:ext uri="{386F3935-93C4-4BCD-93E2-E3B085C9AB24}">
+                <p16:designElem xmlns:p16="http://schemas.microsoft.com/office/powerpoint/2015/main" val="1"/>
+              </p:ext>
+            </p:extLst>
+          </p:nvPr>
+        </p:nvSpPr>
+        <p:spPr>
+          <a:xfrm>
+            <a:off x="0" y="0"/>
+            <a:ext cx="12191999" cy="6858000"/>
+          </a:xfrm>
+          <a:prstGeom prst="rect">
+            <a:avLst/>
+          </a:prstGeom>
+          <a:ln>
+            <a:noFill/>
+          </a:ln>
+        </p:spPr>
+        <p:style>
+          <a:lnRef idx="2">
+            <a:schemeClr val="accent1">
+              <a:shade val="50000"/>
+            </a:schemeClr>
+          </a:lnRef>
+          <a:fillRef idx="1">
+            <a:schemeClr val="accent1"/>
+          </a:fillRef>
+          <a:effectRef idx="0">
+            <a:schemeClr val="accent1"/>
+          </a:effectRef>
+          <a:fontRef idx="minor">
+            <a:schemeClr val="lt1"/>
+          </a:fontRef>
+        </p:style>
+        <p:txBody>
+          <a:bodyPr rtlCol="0" anchor="ctr"/>
+          <a:lstStyle/>
+          <a:p>
+            <a:pPr algn="ctr"/>
+            <a:endParaRPr lang="en-US"/>
+          </a:p>
+        </p:txBody>
+      </p:sp>
+      <p:sp>
+        <p:nvSpPr>
+          <p:cNvPr id="12" name="Rectangle 11">
+            <a:extLst>
+              <a:ext uri="{FF2B5EF4-FFF2-40B4-BE49-F238E27FC236}">
+                <a16:creationId xmlns:a16="http://schemas.microsoft.com/office/drawing/2014/main" id="{867D4867-5BA7-4462-B2F6-A23F4A622AA7}"/>
+              </a:ext>
+              <a:ext uri="{C183D7F6-B498-43B3-948B-1728B52AA6E4}">
+                <adec:decorative xmlns:adec="http://schemas.microsoft.com/office/drawing/2017/decorative" val="1"/>
+              </a:ext>
+            </a:extLst>
+          </p:cNvPr>
+          <p:cNvSpPr>
+            <a:spLocks noGrp="1" noRot="1" noChangeAspect="1" noMove="1" noResize="1" noEditPoints="1" noAdjustHandles="1" noChangeArrowheads="1" noChangeShapeType="1" noTextEdit="1"/>
+          </p:cNvSpPr>
+          <p:nvPr>
+            <p:extLst>
+              <p:ext uri="{386F3935-93C4-4BCD-93E2-E3B085C9AB24}">
+                <p16:designElem xmlns:p16="http://schemas.microsoft.com/office/powerpoint/2015/main" val="1"/>
+              </p:ext>
+            </p:extLst>
+          </p:nvPr>
+        </p:nvSpPr>
+        <p:spPr>
+          <a:xfrm>
+            <a:off x="0" y="0"/>
+            <a:ext cx="4654296" cy="6858000"/>
+          </a:xfrm>
+          <a:prstGeom prst="rect">
+            <a:avLst/>
+          </a:prstGeom>
+          <a:solidFill>
+            <a:schemeClr val="tx2"/>
+          </a:solidFill>
+          <a:ln>
+            <a:noFill/>
+          </a:ln>
+        </p:spPr>
+        <p:style>
+          <a:lnRef idx="0">
+            <a:scrgbClr r="0" g="0" b="0"/>
+          </a:lnRef>
+          <a:fillRef idx="0">
+            <a:scrgbClr r="0" g="0" b="0"/>
+          </a:fillRef>
+          <a:effectRef idx="0">
+            <a:scrgbClr r="0" g="0" b="0"/>
+          </a:effectRef>
+          <a:fontRef idx="minor">
+            <a:schemeClr val="lt1"/>
+          </a:fontRef>
+        </p:style>
+        <p:txBody>
+          <a:bodyPr rtlCol="0" anchor="ctr"/>
+          <a:lstStyle/>
+          <a:p>
+            <a:pPr algn="ctr"/>
+            <a:endParaRPr lang="en-US"/>
+          </a:p>
+        </p:txBody>
+      </p:sp>
+      <p:sp>
+        <p:nvSpPr>
+          <p:cNvPr id="2" name="Titel 1">
+            <a:extLst>
+              <a:ext uri="{FF2B5EF4-FFF2-40B4-BE49-F238E27FC236}">
+                <a16:creationId xmlns:a16="http://schemas.microsoft.com/office/drawing/2014/main" id="{18DF5262-DED7-13AD-46BA-232EDD877D40}"/>
+              </a:ext>
+            </a:extLst>
+          </p:cNvPr>
+          <p:cNvSpPr>
+            <a:spLocks noGrp="1"/>
+          </p:cNvSpPr>
+          <p:nvPr>
+            <p:ph type="title"/>
+          </p:nvPr>
+        </p:nvSpPr>
+        <p:spPr>
+          <a:xfrm>
+            <a:off x="643467" y="643467"/>
+            <a:ext cx="3363974" cy="1728044"/>
+          </a:xfrm>
+          <a:noFill/>
+          <a:ln>
+            <a:solidFill>
+              <a:schemeClr val="bg1"/>
+            </a:solidFill>
+          </a:ln>
+        </p:spPr>
+        <p:txBody>
+          <a:bodyPr wrap="square">
+            <a:normAutofit/>
+          </a:bodyPr>
+          <a:lstStyle/>
+          <a:p>
+            <a:r>
+              <a:rPr lang="de-DE">
+                <a:solidFill>
+                  <a:schemeClr val="bg1"/>
+                </a:solidFill>
+              </a:rPr>
+              <a:t>Anpassung des Netzes an Dropout</a:t>
+            </a:r>
+          </a:p>
+        </p:txBody>
+      </p:sp>
+      <p:sp>
+        <p:nvSpPr>
+          <p:cNvPr id="3" name="Inhaltsplatzhalter 2">
+            <a:extLst>
+              <a:ext uri="{FF2B5EF4-FFF2-40B4-BE49-F238E27FC236}">
+                <a16:creationId xmlns:a16="http://schemas.microsoft.com/office/drawing/2014/main" id="{46A4DF32-94EA-E089-B4A9-7F0278C7A61E}"/>
+              </a:ext>
+            </a:extLst>
+          </p:cNvPr>
+          <p:cNvSpPr>
+            <a:spLocks noGrp="1"/>
+          </p:cNvSpPr>
+          <p:nvPr>
+            <p:ph idx="1"/>
+          </p:nvPr>
+        </p:nvSpPr>
+        <p:spPr>
+          <a:xfrm>
+            <a:off x="643468" y="2638044"/>
+            <a:ext cx="3363974" cy="3415622"/>
+          </a:xfrm>
+        </p:spPr>
+        <p:txBody>
+          <a:bodyPr>
+            <a:normAutofit fontScale="92500" lnSpcReduction="20000"/>
+          </a:bodyPr>
+          <a:lstStyle/>
+          <a:p>
+            <a:r>
+              <a:rPr lang="de-DE" dirty="0">
+                <a:solidFill>
+                  <a:schemeClr val="bg1"/>
+                </a:solidFill>
+              </a:rPr>
+              <a:t>Erhöhung der Neuronen wie folgt:</a:t>
+            </a:r>
+          </a:p>
+          <a:p>
+            <a:pPr lvl="1"/>
+            <a:r>
+              <a:rPr lang="de-DE" dirty="0">
+                <a:solidFill>
+                  <a:schemeClr val="bg1"/>
+                </a:solidFill>
+              </a:rPr>
+              <a:t>Layer 1: 256</a:t>
+            </a:r>
+          </a:p>
+          <a:p>
+            <a:pPr lvl="1"/>
+            <a:r>
+              <a:rPr lang="de-DE" dirty="0">
+                <a:solidFill>
+                  <a:schemeClr val="bg1"/>
+                </a:solidFill>
+              </a:rPr>
+              <a:t>Layer 2: 128</a:t>
+            </a:r>
+          </a:p>
+          <a:p>
+            <a:pPr lvl="1"/>
+            <a:r>
+              <a:rPr lang="de-DE" dirty="0">
+                <a:solidFill>
+                  <a:schemeClr val="bg1"/>
+                </a:solidFill>
+              </a:rPr>
+              <a:t>Layer 3: 64</a:t>
+            </a:r>
+          </a:p>
+          <a:p>
+            <a:r>
+              <a:rPr lang="de-DE" dirty="0">
+                <a:solidFill>
+                  <a:schemeClr val="bg1"/>
+                </a:solidFill>
+              </a:rPr>
+              <a:t>Ergebnisse: </a:t>
+            </a:r>
+          </a:p>
+          <a:p>
+            <a:pPr lvl="1"/>
+            <a:r>
+              <a:rPr lang="de-DE" dirty="0">
+                <a:solidFill>
+                  <a:schemeClr val="bg1"/>
+                </a:solidFill>
+              </a:rPr>
+              <a:t>Sehr geringe Accuracy</a:t>
+            </a:r>
+          </a:p>
+          <a:p>
+            <a:pPr lvl="1"/>
+            <a:r>
+              <a:rPr lang="de-DE" dirty="0">
+                <a:solidFill>
+                  <a:schemeClr val="bg1"/>
+                </a:solidFill>
+              </a:rPr>
+              <a:t>Hoher Fehler</a:t>
+            </a:r>
+          </a:p>
+          <a:p>
+            <a:r>
+              <a:rPr lang="de-DE" dirty="0" err="1">
+                <a:solidFill>
+                  <a:schemeClr val="bg1"/>
+                </a:solidFill>
+              </a:rPr>
+              <a:t>Conclusion</a:t>
+            </a:r>
+            <a:r>
+              <a:rPr lang="de-DE" dirty="0">
+                <a:solidFill>
+                  <a:schemeClr val="bg1"/>
+                </a:solidFill>
+              </a:rPr>
+              <a:t>: weiterhin zu wenige Neuronen im Netz um Dropout von 0.5 ausgleichen zu können</a:t>
+            </a:r>
+            <a:br>
+              <a:rPr lang="de-DE" dirty="0">
+                <a:solidFill>
+                  <a:schemeClr val="bg1"/>
+                </a:solidFill>
+              </a:rPr>
+            </a:br>
+            <a:endParaRPr lang="de-DE" dirty="0">
+              <a:solidFill>
+                <a:schemeClr val="bg1"/>
+              </a:solidFill>
+            </a:endParaRPr>
+          </a:p>
+        </p:txBody>
+      </p:sp>
+      <p:pic>
+        <p:nvPicPr>
+          <p:cNvPr id="5" name="Grafik 4">
+            <a:extLst>
+              <a:ext uri="{FF2B5EF4-FFF2-40B4-BE49-F238E27FC236}">
+                <a16:creationId xmlns:a16="http://schemas.microsoft.com/office/drawing/2014/main" id="{54B88399-7707-5784-5CE7-A8AF5112C9AB}"/>
+              </a:ext>
+            </a:extLst>
+          </p:cNvPr>
+          <p:cNvPicPr>
+            <a:picLocks noChangeAspect="1"/>
+          </p:cNvPicPr>
+          <p:nvPr/>
+        </p:nvPicPr>
+        <p:blipFill>
+          <a:blip r:embed="rId2">
+            <a:extLst>
+              <a:ext uri="{96DAC541-7B7A-43D3-8B79-37D633B846F1}">
+                <asvg:svgBlip xmlns:asvg="http://schemas.microsoft.com/office/drawing/2016/SVG/main" r:embed="rId3"/>
+              </a:ext>
+            </a:extLst>
+          </a:blip>
+          <a:stretch>
+            <a:fillRect/>
+          </a:stretch>
+        </p:blipFill>
+        <p:spPr>
+          <a:xfrm>
+            <a:off x="5297763" y="2268576"/>
+            <a:ext cx="6250769" cy="2159981"/>
+          </a:xfrm>
+          <a:prstGeom prst="rect">
+            <a:avLst/>
+          </a:prstGeom>
+        </p:spPr>
+      </p:pic>
+    </p:spTree>
+    <p:extLst>
+      <p:ext uri="{BB962C8B-B14F-4D97-AF65-F5344CB8AC3E}">
+        <p14:creationId xmlns:p14="http://schemas.microsoft.com/office/powerpoint/2010/main" val="2827927259"/>
+      </p:ext>
+    </p:extLst>
+  </p:cSld>
+  <p:clrMapOvr>
+    <a:masterClrMapping/>
+  </p:clrMapOvr>
+</p:sld>
+</file>
+
+<file path=ppt/slides/slide9.xml><?xml version="1.0" encoding="utf-8"?>
+<p:sld xmlns:a="http://schemas.openxmlformats.org/drawingml/2006/main" xmlns:r="http://schemas.openxmlformats.org/officeDocument/2006/relationships" xmlns:p="http://schemas.openxmlformats.org/presentationml/2006/main">
+  <p:cSld>
+    <p:spTree>
+      <p:nvGrpSpPr>
+        <p:cNvPr id="1" name=""/>
+        <p:cNvGrpSpPr/>
+        <p:nvPr/>
+      </p:nvGrpSpPr>
+      <p:grpSpPr>
+        <a:xfrm>
+          <a:off x="0" y="0"/>
+          <a:ext cx="0" cy="0"/>
+          <a:chOff x="0" y="0"/>
+          <a:chExt cx="0" cy="0"/>
+        </a:xfrm>
+      </p:grpSpPr>
+      <p:sp>
+        <p:nvSpPr>
+          <p:cNvPr id="2" name="Titel 1">
+            <a:extLst>
+              <a:ext uri="{FF2B5EF4-FFF2-40B4-BE49-F238E27FC236}">
+                <a16:creationId xmlns:a16="http://schemas.microsoft.com/office/drawing/2014/main" id="{E34B6098-3FC7-2F93-8C5E-937798C60CE5}"/>
+              </a:ext>
+            </a:extLst>
+          </p:cNvPr>
+          <p:cNvSpPr>
+            <a:spLocks noGrp="1"/>
+          </p:cNvSpPr>
+          <p:nvPr>
+            <p:ph type="title"/>
+          </p:nvPr>
+        </p:nvSpPr>
+        <p:spPr/>
+        <p:txBody>
+          <a:bodyPr/>
+          <a:lstStyle/>
+          <a:p>
+            <a:r>
+              <a:rPr lang="de-DE"/>
+              <a:t>Iterationen: </a:t>
+            </a:r>
+            <a:r>
+              <a:rPr lang="de-DE" dirty="0"/>
+              <a:t>Anpassung An Dropout</a:t>
+            </a:r>
+          </a:p>
+        </p:txBody>
+      </p:sp>
+      <p:sp>
+        <p:nvSpPr>
+          <p:cNvPr id="3" name="Inhaltsplatzhalter 2">
+            <a:extLst>
+              <a:ext uri="{FF2B5EF4-FFF2-40B4-BE49-F238E27FC236}">
+                <a16:creationId xmlns:a16="http://schemas.microsoft.com/office/drawing/2014/main" id="{72F4C2DA-3B3F-C9DE-B9B2-CB1BE038D751}"/>
+              </a:ext>
+            </a:extLst>
+          </p:cNvPr>
+          <p:cNvSpPr>
+            <a:spLocks noGrp="1"/>
+          </p:cNvSpPr>
+          <p:nvPr>
+            <p:ph idx="1"/>
+          </p:nvPr>
+        </p:nvSpPr>
+        <p:spPr/>
+        <p:txBody>
+          <a:bodyPr/>
+          <a:lstStyle/>
+          <a:p>
+            <a:endParaRPr lang="de-DE" dirty="0"/>
+          </a:p>
+        </p:txBody>
+      </p:sp>
+    </p:spTree>
+    <p:extLst>
+      <p:ext uri="{BB962C8B-B14F-4D97-AF65-F5344CB8AC3E}">
+        <p14:creationId xmlns:p14="http://schemas.microsoft.com/office/powerpoint/2010/main" val="3565048064"/>
       </p:ext>
     </p:extLst>
   </p:cSld>

</xml_diff>

<commit_message>
Plot various batch sizes and epochs
</commit_message>
<xml_diff>
--- a/Folien_Modularbeit.pptx
+++ b/Folien_Modularbeit.pptx
@@ -112,6 +112,11 @@
       </a:defRPr>
     </a:lvl9pPr>
   </p:defaultTextStyle>
+  <p:extLst>
+    <p:ext uri="{EFAFB233-063F-42B5-8137-9DF3F51BA10A}">
+      <p15:sldGuideLst xmlns:p15="http://schemas.microsoft.com/office/powerpoint/2012/main"/>
+    </p:ext>
+  </p:extLst>
 </p:presentation>
 </file>
 
@@ -278,7 +283,7 @@
           <a:p>
             <a:fld id="{1160EA64-D806-43AC-9DF2-F8C432F32B4C}" type="datetimeFigureOut">
               <a:rPr lang="en-US" dirty="0"/>
-              <a:t>1/22/23</a:t>
+              <a:t>1/24/23</a:t>
             </a:fld>
             <a:endParaRPr lang="en-US" dirty="0"/>
           </a:p>
@@ -444,7 +449,7 @@
           <a:p>
             <a:fld id="{E9F9C37B-1D36-470B-8223-D6C91242EC14}" type="datetimeFigureOut">
               <a:rPr lang="en-US" dirty="0"/>
-              <a:t>1/22/23</a:t>
+              <a:t>1/24/23</a:t>
             </a:fld>
             <a:endParaRPr lang="en-US" dirty="0"/>
           </a:p>
@@ -619,7 +624,7 @@
           <a:p>
             <a:fld id="{67C6F52A-A82B-47A2-A83A-8C4C91F2D59F}" type="datetimeFigureOut">
               <a:rPr lang="en-US" dirty="0"/>
-              <a:t>1/22/23</a:t>
+              <a:t>1/24/23</a:t>
             </a:fld>
             <a:endParaRPr lang="en-US" dirty="0"/>
           </a:p>
@@ -784,7 +789,7 @@
           <a:p>
             <a:fld id="{F070A7B3-6521-4DCA-87E5-044747A908C1}" type="datetimeFigureOut">
               <a:rPr lang="en-US" dirty="0"/>
-              <a:t>1/22/23</a:t>
+              <a:t>1/24/23</a:t>
             </a:fld>
             <a:endParaRPr lang="en-US" dirty="0"/>
           </a:p>
@@ -1048,7 +1053,7 @@
           <a:p>
             <a:fld id="{1160EA64-D806-43AC-9DF2-F8C432F32B4C}" type="datetimeFigureOut">
               <a:rPr lang="en-US" dirty="0"/>
-              <a:t>1/22/23</a:t>
+              <a:t>1/24/23</a:t>
             </a:fld>
             <a:endParaRPr lang="en-US" dirty="0"/>
           </a:p>
@@ -1276,7 +1281,7 @@
           <a:p>
             <a:fld id="{AB134690-1557-4C89-A502-4959FE7FAD70}" type="datetimeFigureOut">
               <a:rPr lang="en-US" dirty="0"/>
-              <a:t>1/22/23</a:t>
+              <a:t>1/24/23</a:t>
             </a:fld>
             <a:endParaRPr lang="en-US" dirty="0"/>
           </a:p>
@@ -1630,7 +1635,7 @@
           <a:p>
             <a:fld id="{4F7D4976-E339-4826-83B7-FBD03F55ECF8}" type="datetimeFigureOut">
               <a:rPr lang="en-US" dirty="0"/>
-              <a:t>1/22/23</a:t>
+              <a:t>1/24/23</a:t>
             </a:fld>
             <a:endParaRPr lang="en-US" dirty="0"/>
           </a:p>
@@ -1766,7 +1771,7 @@
           <a:p>
             <a:fld id="{E1037C31-9E7A-4F99-8774-A0E530DE1A42}" type="datetimeFigureOut">
               <a:rPr lang="en-US" dirty="0"/>
-              <a:t>1/22/23</a:t>
+              <a:t>1/24/23</a:t>
             </a:fld>
             <a:endParaRPr lang="en-US" dirty="0"/>
           </a:p>
@@ -1856,7 +1861,7 @@
           <a:p>
             <a:fld id="{C278504F-A551-4DE0-9316-4DCD1D8CC752}" type="datetimeFigureOut">
               <a:rPr lang="en-US" dirty="0"/>
-              <a:t>1/22/23</a:t>
+              <a:t>1/24/23</a:t>
             </a:fld>
             <a:endParaRPr lang="en-US" dirty="0"/>
           </a:p>
@@ -2208,7 +2213,7 @@
           <a:p>
             <a:fld id="{D1BE4249-C0D0-4B06-8692-E8BB871AF643}" type="datetimeFigureOut">
               <a:rPr lang="en-US" dirty="0"/>
-              <a:t>1/22/23</a:t>
+              <a:t>1/24/23</a:t>
             </a:fld>
             <a:endParaRPr lang="en-US" dirty="0"/>
           </a:p>
@@ -2560,7 +2565,7 @@
           <a:p>
             <a:fld id="{042B0DB6-F5C7-45FB-8CF3-31B45F9C2DAC}" type="datetimeFigureOut">
               <a:rPr lang="en-US" dirty="0"/>
-              <a:t>1/22/23</a:t>
+              <a:t>1/24/23</a:t>
             </a:fld>
             <a:endParaRPr lang="en-US" dirty="0"/>
           </a:p>
@@ -2797,7 +2802,7 @@
           <a:p>
             <a:fld id="{1160EA64-D806-43AC-9DF2-F8C432F32B4C}" type="datetimeFigureOut">
               <a:rPr lang="en-US" dirty="0"/>
-              <a:t>1/22/23</a:t>
+              <a:t>1/24/23</a:t>
             </a:fld>
             <a:endParaRPr lang="en-US" dirty="0"/>
           </a:p>
@@ -3657,7 +3662,7 @@
                   <a:srgbClr val="FFFFFF"/>
                 </a:solidFill>
               </a:rPr>
-              <a:t>Input-Schicht mit XYZ Neuronen, Input-Dimension von 1024 (32x32 Pixel, 1 Farbkanal)</a:t>
+              <a:t>Input-Schicht mit Input-Dimension von 1024 (32x32 Pixel, 1 Farbkanal)</a:t>
             </a:r>
           </a:p>
           <a:p>

</xml_diff>